<commit_message>
Minor Updates to my slides
</commit_message>
<xml_diff>
--- a/project/848_Project_Presentation_Fasburg_Thomas.pptx
+++ b/project/848_Project_Presentation_Fasburg_Thomas.pptx
@@ -119,7 +119,7 @@
   </p:defaultTextStyle>
   <p:extLst>
     <p:ext uri="{EFAFB233-063F-42B5-8137-9DF3F51BA10A}">
-      <p15:sldGuideLst xmlns:p15="http://schemas.microsoft.com/office/powerpoint/2012/main" xmlns="">
+      <p15:sldGuideLst xmlns="" xmlns:p15="http://schemas.microsoft.com/office/powerpoint/2012/main">
         <p15:guide id="1" orient="horz" pos="2160">
           <p15:clr>
             <a:srgbClr val="A4A3A4"/>
@@ -218,7 +218,7 @@
           <a:p>
             <a:fld id="{A63B8CFC-D614-4432-A7DB-A65856E85B43}" type="datetimeFigureOut">
               <a:rPr lang="en-US" smtClean="0"/>
-              <a:t>11/26/2015</a:t>
+              <a:t>11/30/2015</a:t>
             </a:fld>
             <a:endParaRPr lang="en-US" dirty="0"/>
           </a:p>
@@ -1241,11 +1241,7 @@
           <a:p>
             <a:r>
               <a:rPr lang="en-US" baseline="0" dirty="0" smtClean="0"/>
-              <a:t>N is power spectral density of noise-only portion of </a:t>
-            </a:r>
-            <a:r>
-              <a:rPr lang="en-US" baseline="0" dirty="0" smtClean="0"/>
-              <a:t>signal</a:t>
+              <a:t>N is power spectral density of noise-only portion of signal</a:t>
             </a:r>
           </a:p>
           <a:p>
@@ -2178,7 +2174,7 @@
           <a:p>
             <a:fld id="{ADE5661A-BDAA-4579-B2F5-AA9011776D83}" type="datetimeFigureOut">
               <a:rPr lang="en-US" smtClean="0"/>
-              <a:t>11/26/2015</a:t>
+              <a:t>11/30/2015</a:t>
             </a:fld>
             <a:endParaRPr lang="en-US" dirty="0"/>
           </a:p>
@@ -2376,7 +2372,7 @@
             <a:fld id="{1D8BD707-D9CF-40AE-B4C6-C98DA3205C09}" type="datetimeFigureOut">
               <a:rPr lang="en-US" smtClean="0"/>
               <a:pPr/>
-              <a:t>11/26/2015</a:t>
+              <a:t>11/30/2015</a:t>
             </a:fld>
             <a:endParaRPr lang="en-US" dirty="0"/>
           </a:p>
@@ -2563,7 +2559,7 @@
             <a:fld id="{1D8BD707-D9CF-40AE-B4C6-C98DA3205C09}" type="datetimeFigureOut">
               <a:rPr lang="en-US" smtClean="0"/>
               <a:pPr/>
-              <a:t>11/26/2015</a:t>
+              <a:t>11/30/2015</a:t>
             </a:fld>
             <a:endParaRPr lang="en-US" dirty="0"/>
           </a:p>
@@ -2715,7 +2711,7 @@
             <a:fld id="{1D8BD707-D9CF-40AE-B4C6-C98DA3205C09}" type="datetimeFigureOut">
               <a:rPr lang="en-US" smtClean="0"/>
               <a:pPr/>
-              <a:t>11/26/2015</a:t>
+              <a:t>11/30/2015</a:t>
             </a:fld>
             <a:endParaRPr lang="en-US" dirty="0"/>
           </a:p>
@@ -2971,7 +2967,7 @@
           <a:p>
             <a:fld id="{7D698992-9F5B-4E9D-871D-4517B2EC8643}" type="datetimeFigureOut">
               <a:rPr lang="en-US" smtClean="0"/>
-              <a:t>11/26/2015</a:t>
+              <a:t>11/30/2015</a:t>
             </a:fld>
             <a:endParaRPr lang="en-US" dirty="0"/>
           </a:p>
@@ -3381,7 +3377,7 @@
             <a:fld id="{1D8BD707-D9CF-40AE-B4C6-C98DA3205C09}" type="datetimeFigureOut">
               <a:rPr lang="en-US" smtClean="0"/>
               <a:pPr/>
-              <a:t>11/26/2015</a:t>
+              <a:t>11/30/2015</a:t>
             </a:fld>
             <a:endParaRPr lang="en-US" dirty="0"/>
           </a:p>
@@ -3829,7 +3825,7 @@
             <a:fld id="{1D8BD707-D9CF-40AE-B4C6-C98DA3205C09}" type="datetimeFigureOut">
               <a:rPr lang="en-US" smtClean="0"/>
               <a:pPr/>
-              <a:t>11/26/2015</a:t>
+              <a:t>11/30/2015</a:t>
             </a:fld>
             <a:endParaRPr lang="en-US" dirty="0"/>
           </a:p>
@@ -3932,7 +3928,7 @@
             <a:fld id="{1D8BD707-D9CF-40AE-B4C6-C98DA3205C09}" type="datetimeFigureOut">
               <a:rPr lang="en-US" smtClean="0"/>
               <a:pPr/>
-              <a:t>11/26/2015</a:t>
+              <a:t>11/30/2015</a:t>
             </a:fld>
             <a:endParaRPr lang="en-US" dirty="0"/>
           </a:p>
@@ -4055,7 +4051,7 @@
             <a:fld id="{1D8BD707-D9CF-40AE-B4C6-C98DA3205C09}" type="datetimeFigureOut">
               <a:rPr lang="en-US" smtClean="0"/>
               <a:pPr/>
-              <a:t>11/26/2015</a:t>
+              <a:t>11/30/2015</a:t>
             </a:fld>
             <a:endParaRPr lang="en-US" dirty="0"/>
           </a:p>
@@ -4331,7 +4327,7 @@
             <a:fld id="{1D8BD707-D9CF-40AE-B4C6-C98DA3205C09}" type="datetimeFigureOut">
               <a:rPr lang="en-US" smtClean="0"/>
               <a:pPr/>
-              <a:t>11/26/2015</a:t>
+              <a:t>11/30/2015</a:t>
             </a:fld>
             <a:endParaRPr lang="en-US" dirty="0"/>
           </a:p>
@@ -4538,7 +4534,7 @@
             <a:fld id="{1D8BD707-D9CF-40AE-B4C6-C98DA3205C09}" type="datetimeFigureOut">
               <a:rPr lang="en-US" smtClean="0"/>
               <a:pPr/>
-              <a:t>11/26/2015</a:t>
+              <a:t>11/30/2015</a:t>
             </a:fld>
             <a:endParaRPr lang="en-US" dirty="0"/>
           </a:p>
@@ -5649,7 +5645,7 @@
             <a:fld id="{1D8BD707-D9CF-40AE-B4C6-C98DA3205C09}" type="datetimeFigureOut">
               <a:rPr lang="en-US" smtClean="0"/>
               <a:pPr/>
-              <a:t>11/26/2015</a:t>
+              <a:t>11/30/2015</a:t>
             </a:fld>
             <a:endParaRPr lang="en-US" dirty="0"/>
           </a:p>
@@ -6757,7 +6753,6 @@
               <a:rPr lang="en-US" dirty="0" smtClean="0"/>
               <a:t>Speech/Noise decision with hold times</a:t>
             </a:r>
-            <a:endParaRPr lang="en-US" dirty="0" smtClean="0"/>
           </a:p>
           <a:p>
             <a:r>
@@ -6893,11 +6888,7 @@
           <a:p>
             <a:r>
               <a:rPr lang="en-US" dirty="0" smtClean="0"/>
-              <a:t>Parameters: </a:t>
-            </a:r>
-            <a:r>
-              <a:rPr lang="en-US" dirty="0" smtClean="0"/>
-              <a:t>SNR Smoothing Factor</a:t>
+              <a:t>Parameters: SNR Smoothing Factor</a:t>
             </a:r>
           </a:p>
         </p:txBody>
@@ -6919,22 +6910,14 @@
           <a:p>
             <a:r>
               <a:rPr lang="en-US" dirty="0" smtClean="0"/>
-              <a:t>Background: </a:t>
-            </a:r>
-            <a:r>
-              <a:rPr lang="en-US" dirty="0" smtClean="0"/>
-              <a:t>Wiener </a:t>
-            </a:r>
-            <a:r>
-              <a:rPr lang="en-US" dirty="0" smtClean="0"/>
-              <a:t>Filter</a:t>
+              <a:t>Background: Wiener Filter</a:t>
             </a:r>
             <a:endParaRPr lang="en-US" dirty="0"/>
           </a:p>
         </p:txBody>
       </p:sp>
-      <mc:AlternateContent xmlns:mc="http://schemas.openxmlformats.org/markup-compatibility/2006">
-        <mc:Choice xmlns:a14="http://schemas.microsoft.com/office/drawing/2010/main" Requires="a14">
+      <mc:AlternateContent xmlns:mc="http://schemas.openxmlformats.org/markup-compatibility/2006" xmlns:a14="http://schemas.microsoft.com/office/drawing/2010/main">
+        <mc:Choice Requires="a14">
           <p:sp>
             <p:nvSpPr>
               <p:cNvPr id="4" name="TextBox 3"/>
@@ -7082,7 +7065,7 @@
             </p:txBody>
           </p:sp>
         </mc:Choice>
-        <mc:Fallback>
+        <mc:Fallback xmlns="">
           <p:sp>
             <p:nvSpPr>
               <p:cNvPr id="4" name="TextBox 3"/>
@@ -7121,8 +7104,8 @@
           </p:sp>
         </mc:Fallback>
       </mc:AlternateContent>
-      <mc:AlternateContent xmlns:mc="http://schemas.openxmlformats.org/markup-compatibility/2006">
-        <mc:Choice xmlns:a14="http://schemas.microsoft.com/office/drawing/2010/main" Requires="a14">
+      <mc:AlternateContent xmlns:mc="http://schemas.openxmlformats.org/markup-compatibility/2006" xmlns:a14="http://schemas.microsoft.com/office/drawing/2010/main">
+        <mc:Choice Requires="a14">
           <p:sp>
             <p:nvSpPr>
               <p:cNvPr id="8" name="TextBox 7"/>
@@ -7145,6 +7128,7 @@
               </a:bodyPr>
               <a:lstStyle/>
               <a:p>
+                <a:pPr/>
                 <a14:m>
                   <m:oMathPara xmlns:m="http://schemas.openxmlformats.org/officeDocument/2006/math">
                     <m:oMathParaPr>
@@ -7248,7 +7232,7 @@
             </p:txBody>
           </p:sp>
         </mc:Choice>
-        <mc:Fallback>
+        <mc:Fallback xmlns="">
           <p:sp>
             <p:nvSpPr>
               <p:cNvPr id="8" name="TextBox 7"/>
@@ -7287,8 +7271,8 @@
           </p:sp>
         </mc:Fallback>
       </mc:AlternateContent>
-      <mc:AlternateContent xmlns:mc="http://schemas.openxmlformats.org/markup-compatibility/2006">
-        <mc:Choice xmlns:a14="http://schemas.microsoft.com/office/drawing/2010/main" Requires="a14">
+      <mc:AlternateContent xmlns:mc="http://schemas.openxmlformats.org/markup-compatibility/2006" xmlns:a14="http://schemas.microsoft.com/office/drawing/2010/main">
+        <mc:Choice Requires="a14">
           <p:sp>
             <p:nvSpPr>
               <p:cNvPr id="5" name="TextBox 4"/>
@@ -7311,6 +7295,7 @@
               </a:bodyPr>
               <a:lstStyle/>
               <a:p>
+                <a:pPr/>
                 <a14:m>
                   <m:oMathPara xmlns:m="http://schemas.openxmlformats.org/officeDocument/2006/math">
                     <m:oMathParaPr>
@@ -7602,7 +7587,7 @@
             </p:txBody>
           </p:sp>
         </mc:Choice>
-        <mc:Fallback>
+        <mc:Fallback xmlns="">
           <p:sp>
             <p:nvSpPr>
               <p:cNvPr id="5" name="TextBox 4"/>
@@ -7852,7 +7837,15 @@
             </a:r>
             <a:r>
               <a:rPr lang="en-US" dirty="0" smtClean="0"/>
-              <a:t> = 6 parents, </a:t>
+              <a:t> = </a:t>
+            </a:r>
+            <a:r>
+              <a:rPr lang="en-US" dirty="0" smtClean="0"/>
+              <a:t>6,12,24  </a:t>
+            </a:r>
+            <a:r>
+              <a:rPr lang="en-US" dirty="0" smtClean="0"/>
+              <a:t>parents, </a:t>
             </a:r>
             <a:r>
               <a:rPr lang="el-GR" dirty="0" smtClean="0"/>
@@ -7860,7 +7853,15 @@
             </a:r>
             <a:r>
               <a:rPr lang="en-US" dirty="0" smtClean="0"/>
-              <a:t> = 12 offspring</a:t>
+              <a:t> = </a:t>
+            </a:r>
+            <a:r>
+              <a:rPr lang="en-US" dirty="0" smtClean="0"/>
+              <a:t>12,24,48 </a:t>
+            </a:r>
+            <a:r>
+              <a:rPr lang="en-US" dirty="0" smtClean="0"/>
+              <a:t>offspring</a:t>
             </a:r>
           </a:p>
           <a:p>
@@ -8424,7 +8425,7 @@
           <p:spPr>
             <a:xfrm>
               <a:off x="4960620" y="5029200"/>
-              <a:ext cx="685800" cy="0"/>
+              <a:ext cx="704088" cy="0"/>
             </a:xfrm>
             <a:prstGeom prst="line">
               <a:avLst/>
@@ -8484,7 +8485,7 @@
           <p:spPr>
             <a:xfrm flipV="1">
               <a:off x="5664708" y="4302252"/>
-              <a:ext cx="0" cy="685800"/>
+              <a:ext cx="0" cy="726948"/>
             </a:xfrm>
             <a:prstGeom prst="line">
               <a:avLst/>
@@ -8514,7 +8515,7 @@
           <p:spPr>
             <a:xfrm>
               <a:off x="4960620" y="3698748"/>
-              <a:ext cx="685800" cy="0"/>
+              <a:ext cx="704088" cy="0"/>
             </a:xfrm>
             <a:prstGeom prst="line">
               <a:avLst/>

</xml_diff>

<commit_message>
updated to match your new slides
</commit_message>
<xml_diff>
--- a/project/848_Project_Presentation_Fasburg_Thomas.pptx
+++ b/project/848_Project_Presentation_Fasburg_Thomas.pptx
@@ -8320,7 +8320,7 @@
           <p:nvPr>
             <p:extLst>
               <p:ext uri="{D42A27DB-BD31-4B8C-83A1-F6EECF244321}">
-                <p14:modId xmlns:p14="http://schemas.microsoft.com/office/powerpoint/2010/main" val="3588639818"/>
+                <p14:modId xmlns:p14="http://schemas.microsoft.com/office/powerpoint/2010/main" val="3027804970"/>
               </p:ext>
             </p:extLst>
           </p:nvPr>
@@ -9991,12 +9991,12 @@
                     <a:p>
                       <a:pPr algn="ctr"/>
                       <a:r>
-                        <a:rPr lang="en-US" dirty="0" smtClean="0">
+                        <a:rPr lang="en-US" smtClean="0">
                           <a:solidFill>
                             <a:sysClr val="windowText" lastClr="000000"/>
                           </a:solidFill>
                         </a:rPr>
-                        <a:t>18</a:t>
+                        <a:t>20</a:t>
                       </a:r>
                       <a:endParaRPr lang="en-US" dirty="0">
                         <a:solidFill>
@@ -11039,7 +11039,7 @@
                             <a:sysClr val="windowText" lastClr="000000"/>
                           </a:solidFill>
                         </a:rPr>
-                        <a:t>0.03</a:t>
+                        <a:t>-</a:t>
                       </a:r>
                       <a:endParaRPr lang="en-US" dirty="0">
                         <a:solidFill>
@@ -11100,7 +11100,7 @@
                             <a:sysClr val="windowText" lastClr="000000"/>
                           </a:solidFill>
                         </a:rPr>
-                        <a:t>0.03</a:t>
+                        <a:t>-</a:t>
                       </a:r>
                       <a:endParaRPr lang="en-US" dirty="0">
                         <a:solidFill>
@@ -11407,7 +11407,7 @@
                             <a:sysClr val="windowText" lastClr="000000"/>
                           </a:solidFill>
                         </a:rPr>
-                        <a:t>1.5</a:t>
+                        <a:t>-</a:t>
                       </a:r>
                       <a:endParaRPr lang="en-US" dirty="0">
                         <a:solidFill>
@@ -11468,7 +11468,7 @@
                             <a:sysClr val="windowText" lastClr="000000"/>
                           </a:solidFill>
                         </a:rPr>
-                        <a:t>1.5</a:t>
+                        <a:t>-</a:t>
                       </a:r>
                       <a:endParaRPr lang="en-US" dirty="0">
                         <a:solidFill>

</xml_diff>